<commit_message>
TF-1C Requirements Model Update
Updated the core requirements model (added IHE Profile) and some of the text in the subsequent table.
</commit_message>
<xml_diff>
--- a/sources/vol1-diagram-sdpi-req-types-model.pptx
+++ b/sources/vol1-diagram-sdpi-req-types-model.pptx
@@ -197,7 +197,7 @@
           <a:p>
             <a:fld id="{8D25072E-162D-46ED-A5CB-0F20C9B31254}" type="datetimeFigureOut">
               <a:rPr lang="en-US" smtClean="0"/>
-              <a:t>11/3/2022</a:t>
+              <a:t>7/11/2024</a:t>
             </a:fld>
             <a:endParaRPr lang="en-US"/>
           </a:p>
@@ -616,7 +616,7 @@
           <a:p>
             <a:fld id="{2EEC94F7-949D-476A-A216-B4C0495AF0A9}" type="datetime1">
               <a:rPr lang="en-US" smtClean="0"/>
-              <a:t>11/3/2022</a:t>
+              <a:t>7/11/2024</a:t>
             </a:fld>
             <a:endParaRPr lang="en-US" dirty="0"/>
           </a:p>
@@ -1197,7 +1197,7 @@
           <a:p>
             <a:fld id="{32177C7B-DB6C-4979-B431-8A70B6AA02C0}" type="datetime1">
               <a:rPr lang="en-US" smtClean="0"/>
-              <a:t>11/3/2022</a:t>
+              <a:t>7/11/2024</a:t>
             </a:fld>
             <a:endParaRPr lang="en-US"/>
           </a:p>
@@ -1470,7 +1470,7 @@
           <a:p>
             <a:fld id="{6988B30D-439E-4AB2-AA68-B23618995FD5}" type="datetime1">
               <a:rPr lang="en-US" smtClean="0"/>
-              <a:t>11/3/2022</a:t>
+              <a:t>7/11/2024</a:t>
             </a:fld>
             <a:endParaRPr lang="en-US"/>
           </a:p>
@@ -1890,7 +1890,7 @@
           <a:p>
             <a:fld id="{DCD80575-BBBA-48FF-AA29-1886450D5040}" type="datetime1">
               <a:rPr lang="en-US" smtClean="0"/>
-              <a:t>11/3/2022</a:t>
+              <a:t>7/11/2024</a:t>
             </a:fld>
             <a:endParaRPr lang="en-US"/>
           </a:p>
@@ -2044,7 +2044,7 @@
           <a:p>
             <a:fld id="{BC5FA200-2376-48FE-AF10-E289A555E233}" type="datetime1">
               <a:rPr lang="en-US" smtClean="0"/>
-              <a:t>11/3/2022</a:t>
+              <a:t>7/11/2024</a:t>
             </a:fld>
             <a:endParaRPr lang="en-US"/>
           </a:p>
@@ -2206,7 +2206,7 @@
           <a:p>
             <a:fld id="{5413C7E2-5F5A-44A4-9515-26CB28336B65}" type="datetime1">
               <a:rPr lang="en-US" smtClean="0"/>
-              <a:t>11/3/2022</a:t>
+              <a:t>7/11/2024</a:t>
             </a:fld>
             <a:endParaRPr lang="en-US" dirty="0"/>
           </a:p>
@@ -2455,7 +2455,7 @@
           <a:p>
             <a:fld id="{C2466822-F1C2-4EED-8632-36F6A3080457}" type="datetime1">
               <a:rPr lang="en-US" smtClean="0"/>
-              <a:t>11/3/2022</a:t>
+              <a:t>7/11/2024</a:t>
             </a:fld>
             <a:endParaRPr lang="en-US"/>
           </a:p>
@@ -2886,7 +2886,7 @@
         </p:nvSpPr>
         <p:spPr>
           <a:xfrm>
-            <a:off x="2432320" y="3449346"/>
+            <a:off x="3899629" y="3455808"/>
             <a:ext cx="470041" cy="276999"/>
           </a:xfrm>
           <a:prstGeom prst="rect">
@@ -2984,191 +2984,170 @@
           </a:p>
         </p:txBody>
       </p:sp>
-      <p:grpSp>
-        <p:nvGrpSpPr>
-          <p:cNvPr id="13" name="Group 12">
-            <a:extLst>
-              <a:ext uri="{FF2B5EF4-FFF2-40B4-BE49-F238E27FC236}">
-                <a16:creationId xmlns:a16="http://schemas.microsoft.com/office/drawing/2014/main" id="{C2FE643D-4140-4BF2-869B-EFD6F6631F02}"/>
-              </a:ext>
-            </a:extLst>
-          </p:cNvPr>
-          <p:cNvGrpSpPr/>
+      <p:sp>
+        <p:nvSpPr>
+          <p:cNvPr id="14" name="TextBox 13">
+            <a:extLst>
+              <a:ext uri="{FF2B5EF4-FFF2-40B4-BE49-F238E27FC236}">
+                <a16:creationId xmlns:a16="http://schemas.microsoft.com/office/drawing/2014/main" id="{1A3F2FC5-49D1-4F9C-A1B4-C6D065693F16}"/>
+              </a:ext>
+            </a:extLst>
+          </p:cNvPr>
+          <p:cNvSpPr txBox="1"/>
           <p:nvPr/>
-        </p:nvGrpSpPr>
-        <p:grpSpPr>
-          <a:xfrm>
-            <a:off x="1624571" y="3680179"/>
-            <a:ext cx="8619293" cy="377136"/>
-            <a:chOff x="2354487" y="5467841"/>
-            <a:chExt cx="8619293" cy="377136"/>
-          </a:xfrm>
-        </p:grpSpPr>
-        <p:sp>
-          <p:nvSpPr>
-            <p:cNvPr id="14" name="TextBox 13">
-              <a:extLst>
-                <a:ext uri="{FF2B5EF4-FFF2-40B4-BE49-F238E27FC236}">
-                  <a16:creationId xmlns:a16="http://schemas.microsoft.com/office/drawing/2014/main" id="{1A3F2FC5-49D1-4F9C-A1B4-C6D065693F16}"/>
-                </a:ext>
-              </a:extLst>
-            </p:cNvPr>
-            <p:cNvSpPr txBox="1"/>
-            <p:nvPr/>
-          </p:nvSpPr>
-          <p:spPr>
-            <a:xfrm>
-              <a:off x="2354487" y="5467841"/>
-              <a:ext cx="1814246" cy="369332"/>
-            </a:xfrm>
-            <a:prstGeom prst="rect">
-              <a:avLst/>
-            </a:prstGeom>
-            <a:noFill/>
-            <a:ln w="19050">
-              <a:solidFill>
-                <a:srgbClr val="0070C0"/>
-              </a:solidFill>
-            </a:ln>
-          </p:spPr>
-          <p:txBody>
-            <a:bodyPr wrap="square" rtlCol="0">
-              <a:spAutoFit/>
-            </a:bodyPr>
-            <a:lstStyle/>
-            <a:p>
-              <a:pPr algn="ctr"/>
-              <a:r>
-                <a:rPr lang="en-US" dirty="0"/>
-                <a:t>Use Case Feature</a:t>
-              </a:r>
-            </a:p>
-          </p:txBody>
-        </p:sp>
-        <p:sp>
-          <p:nvSpPr>
-            <p:cNvPr id="15" name="TextBox 14">
-              <a:extLst>
-                <a:ext uri="{FF2B5EF4-FFF2-40B4-BE49-F238E27FC236}">
-                  <a16:creationId xmlns:a16="http://schemas.microsoft.com/office/drawing/2014/main" id="{8D8D26C3-7A63-4BA0-9D44-8B92953F6F99}"/>
-                </a:ext>
-              </a:extLst>
-            </p:cNvPr>
-            <p:cNvSpPr txBox="1"/>
-            <p:nvPr/>
-          </p:nvSpPr>
-          <p:spPr>
-            <a:xfrm>
-              <a:off x="4622836" y="5475645"/>
-              <a:ext cx="1814246" cy="369332"/>
-            </a:xfrm>
-            <a:prstGeom prst="rect">
-              <a:avLst/>
-            </a:prstGeom>
-            <a:noFill/>
-            <a:ln w="19050">
-              <a:solidFill>
-                <a:srgbClr val="0070C0"/>
-              </a:solidFill>
-            </a:ln>
-          </p:spPr>
-          <p:txBody>
-            <a:bodyPr wrap="square" rtlCol="0">
-              <a:spAutoFit/>
-            </a:bodyPr>
-            <a:lstStyle/>
-            <a:p>
-              <a:pPr algn="ctr"/>
-              <a:r>
-                <a:rPr lang="en-US" dirty="0"/>
-                <a:t>Ref. Standard ICS</a:t>
-              </a:r>
-            </a:p>
-          </p:txBody>
-        </p:sp>
-        <p:sp>
-          <p:nvSpPr>
-            <p:cNvPr id="16" name="TextBox 15">
-              <a:extLst>
-                <a:ext uri="{FF2B5EF4-FFF2-40B4-BE49-F238E27FC236}">
-                  <a16:creationId xmlns:a16="http://schemas.microsoft.com/office/drawing/2014/main" id="{77AE7BC2-BE92-4F2F-9FDD-F559E2A09691}"/>
-                </a:ext>
-              </a:extLst>
-            </p:cNvPr>
-            <p:cNvSpPr txBox="1"/>
-            <p:nvPr/>
-          </p:nvSpPr>
-          <p:spPr>
-            <a:xfrm>
-              <a:off x="6891185" y="5474304"/>
-              <a:ext cx="1814246" cy="369332"/>
-            </a:xfrm>
-            <a:prstGeom prst="rect">
-              <a:avLst/>
-            </a:prstGeom>
-            <a:noFill/>
-            <a:ln w="19050">
-              <a:solidFill>
-                <a:srgbClr val="0070C0"/>
-              </a:solidFill>
-            </a:ln>
-          </p:spPr>
-          <p:txBody>
-            <a:bodyPr wrap="square" rtlCol="0">
-              <a:spAutoFit/>
-            </a:bodyPr>
-            <a:lstStyle/>
-            <a:p>
-              <a:pPr algn="ctr"/>
-              <a:r>
-                <a:rPr lang="en-US" dirty="0"/>
-                <a:t>SES</a:t>
-              </a:r>
-            </a:p>
-          </p:txBody>
-        </p:sp>
-        <p:sp>
-          <p:nvSpPr>
-            <p:cNvPr id="17" name="TextBox 16">
-              <a:extLst>
-                <a:ext uri="{FF2B5EF4-FFF2-40B4-BE49-F238E27FC236}">
-                  <a16:creationId xmlns:a16="http://schemas.microsoft.com/office/drawing/2014/main" id="{18F293B5-629D-4350-9255-9BECC92BE714}"/>
-                </a:ext>
-              </a:extLst>
-            </p:cNvPr>
-            <p:cNvSpPr txBox="1"/>
-            <p:nvPr/>
-          </p:nvSpPr>
-          <p:spPr>
-            <a:xfrm>
-              <a:off x="9159534" y="5474304"/>
-              <a:ext cx="1814246" cy="369332"/>
-            </a:xfrm>
-            <a:prstGeom prst="rect">
-              <a:avLst/>
-            </a:prstGeom>
-            <a:noFill/>
-            <a:ln w="19050">
-              <a:solidFill>
-                <a:srgbClr val="0070C0"/>
-              </a:solidFill>
-            </a:ln>
-          </p:spPr>
-          <p:txBody>
-            <a:bodyPr wrap="square" rtlCol="0">
-              <a:spAutoFit/>
-            </a:bodyPr>
-            <a:lstStyle/>
-            <a:p>
-              <a:pPr algn="ctr"/>
-              <a:r>
-                <a:rPr lang="en-US" dirty="0"/>
-                <a:t>Tech Feature</a:t>
-              </a:r>
-            </a:p>
-          </p:txBody>
-        </p:sp>
-      </p:grpSp>
+        </p:nvSpPr>
+        <p:spPr>
+          <a:xfrm>
+            <a:off x="3081730" y="3686641"/>
+            <a:ext cx="1814246" cy="369332"/>
+          </a:xfrm>
+          <a:prstGeom prst="rect">
+            <a:avLst/>
+          </a:prstGeom>
+          <a:noFill/>
+          <a:ln w="19050">
+            <a:solidFill>
+              <a:srgbClr val="0070C0"/>
+            </a:solidFill>
+          </a:ln>
+        </p:spPr>
+        <p:txBody>
+          <a:bodyPr wrap="square" rtlCol="0">
+            <a:spAutoFit/>
+          </a:bodyPr>
+          <a:lstStyle/>
+          <a:p>
+            <a:pPr algn="ctr"/>
+            <a:r>
+              <a:rPr lang="en-US" dirty="0"/>
+              <a:t>Use Case Feature</a:t>
+            </a:r>
+          </a:p>
+        </p:txBody>
+      </p:sp>
+      <p:sp>
+        <p:nvSpPr>
+          <p:cNvPr id="15" name="TextBox 14">
+            <a:extLst>
+              <a:ext uri="{FF2B5EF4-FFF2-40B4-BE49-F238E27FC236}">
+                <a16:creationId xmlns:a16="http://schemas.microsoft.com/office/drawing/2014/main" id="{8D8D26C3-7A63-4BA0-9D44-8B92953F6F99}"/>
+              </a:ext>
+            </a:extLst>
+          </p:cNvPr>
+          <p:cNvSpPr txBox="1"/>
+          <p:nvPr/>
+        </p:nvSpPr>
+        <p:spPr>
+          <a:xfrm>
+            <a:off x="5026192" y="3687983"/>
+            <a:ext cx="1814246" cy="369332"/>
+          </a:xfrm>
+          <a:prstGeom prst="rect">
+            <a:avLst/>
+          </a:prstGeom>
+          <a:noFill/>
+          <a:ln w="19050">
+            <a:solidFill>
+              <a:srgbClr val="0070C0"/>
+            </a:solidFill>
+          </a:ln>
+        </p:spPr>
+        <p:txBody>
+          <a:bodyPr wrap="square" rtlCol="0">
+            <a:spAutoFit/>
+          </a:bodyPr>
+          <a:lstStyle/>
+          <a:p>
+            <a:pPr algn="ctr"/>
+            <a:r>
+              <a:rPr lang="en-US" dirty="0"/>
+              <a:t>Ref. Standard ICS</a:t>
+            </a:r>
+          </a:p>
+        </p:txBody>
+      </p:sp>
+      <p:sp>
+        <p:nvSpPr>
+          <p:cNvPr id="16" name="TextBox 15">
+            <a:extLst>
+              <a:ext uri="{FF2B5EF4-FFF2-40B4-BE49-F238E27FC236}">
+                <a16:creationId xmlns:a16="http://schemas.microsoft.com/office/drawing/2014/main" id="{77AE7BC2-BE92-4F2F-9FDD-F559E2A09691}"/>
+              </a:ext>
+            </a:extLst>
+          </p:cNvPr>
+          <p:cNvSpPr txBox="1"/>
+          <p:nvPr/>
+        </p:nvSpPr>
+        <p:spPr>
+          <a:xfrm>
+            <a:off x="6968734" y="3693336"/>
+            <a:ext cx="1814246" cy="369332"/>
+          </a:xfrm>
+          <a:prstGeom prst="rect">
+            <a:avLst/>
+          </a:prstGeom>
+          <a:noFill/>
+          <a:ln w="19050">
+            <a:solidFill>
+              <a:srgbClr val="0070C0"/>
+            </a:solidFill>
+          </a:ln>
+        </p:spPr>
+        <p:txBody>
+          <a:bodyPr wrap="square" rtlCol="0">
+            <a:spAutoFit/>
+          </a:bodyPr>
+          <a:lstStyle/>
+          <a:p>
+            <a:pPr algn="ctr"/>
+            <a:r>
+              <a:rPr lang="en-US" dirty="0"/>
+              <a:t>SES</a:t>
+            </a:r>
+          </a:p>
+        </p:txBody>
+      </p:sp>
+      <p:sp>
+        <p:nvSpPr>
+          <p:cNvPr id="17" name="TextBox 16">
+            <a:extLst>
+              <a:ext uri="{FF2B5EF4-FFF2-40B4-BE49-F238E27FC236}">
+                <a16:creationId xmlns:a16="http://schemas.microsoft.com/office/drawing/2014/main" id="{18F293B5-629D-4350-9255-9BECC92BE714}"/>
+              </a:ext>
+            </a:extLst>
+          </p:cNvPr>
+          <p:cNvSpPr txBox="1"/>
+          <p:nvPr/>
+        </p:nvSpPr>
+        <p:spPr>
+          <a:xfrm>
+            <a:off x="8911276" y="3685432"/>
+            <a:ext cx="1814246" cy="369332"/>
+          </a:xfrm>
+          <a:prstGeom prst="rect">
+            <a:avLst/>
+          </a:prstGeom>
+          <a:noFill/>
+          <a:ln w="19050">
+            <a:solidFill>
+              <a:srgbClr val="0070C0"/>
+            </a:solidFill>
+          </a:ln>
+        </p:spPr>
+        <p:txBody>
+          <a:bodyPr wrap="square" rtlCol="0">
+            <a:spAutoFit/>
+          </a:bodyPr>
+          <a:lstStyle/>
+          <a:p>
+            <a:pPr algn="ctr"/>
+            <a:r>
+              <a:rPr lang="en-US" dirty="0"/>
+              <a:t>Tech Feature</a:t>
+            </a:r>
+          </a:p>
+        </p:txBody>
+      </p:sp>
       <p:cxnSp>
         <p:nvCxnSpPr>
           <p:cNvPr id="18" name="Connector: Elbow 17">
@@ -3187,8 +3166,8 @@
         </p:nvCxnSpPr>
         <p:spPr>
           <a:xfrm rot="5400000">
-            <a:off x="3977225" y="1726008"/>
-            <a:ext cx="508640" cy="3399702"/>
+            <a:off x="4702574" y="2457819"/>
+            <a:ext cx="515102" cy="1942543"/>
           </a:xfrm>
           <a:prstGeom prst="bentConnector3">
             <a:avLst>
@@ -3235,9 +3214,9 @@
           <p:nvPr/>
         </p:nvCxnSpPr>
         <p:spPr>
-          <a:xfrm rot="5400000">
-            <a:off x="5107498" y="2864085"/>
-            <a:ext cx="516444" cy="1131353"/>
+          <a:xfrm rot="16200000" flipH="1">
+            <a:off x="5674133" y="3428801"/>
+            <a:ext cx="516444" cy="1919"/>
           </a:xfrm>
           <a:prstGeom prst="bentConnector3">
             <a:avLst>
@@ -3285,8 +3264,8 @@
         </p:nvCxnSpPr>
         <p:spPr>
           <a:xfrm rot="16200000" flipH="1">
-            <a:off x="6242343" y="2860592"/>
-            <a:ext cx="515103" cy="1136996"/>
+            <a:off x="6642728" y="2460206"/>
+            <a:ext cx="521797" cy="1944461"/>
           </a:xfrm>
           <a:prstGeom prst="bentConnector3">
             <a:avLst>
@@ -3334,8 +3313,8 @@
         </p:nvCxnSpPr>
         <p:spPr>
           <a:xfrm rot="16200000" flipH="1">
-            <a:off x="7376517" y="1726417"/>
-            <a:ext cx="515103" cy="3405345"/>
+            <a:off x="7617951" y="1484983"/>
+            <a:ext cx="513893" cy="3887003"/>
           </a:xfrm>
           <a:prstGeom prst="bentConnector3">
             <a:avLst>
@@ -3415,7 +3394,7 @@
         </p:nvSpPr>
         <p:spPr>
           <a:xfrm>
-            <a:off x="4738551" y="3455661"/>
+            <a:off x="5871823" y="3455661"/>
             <a:ext cx="470041" cy="276999"/>
           </a:xfrm>
           <a:prstGeom prst="rect">
@@ -3451,7 +3430,7 @@
         </p:nvSpPr>
         <p:spPr>
           <a:xfrm>
-            <a:off x="7006900" y="3448218"/>
+            <a:off x="7814365" y="3454912"/>
             <a:ext cx="470041" cy="276999"/>
           </a:xfrm>
           <a:prstGeom prst="rect">
@@ -3487,7 +3466,7 @@
         </p:nvSpPr>
         <p:spPr>
           <a:xfrm>
-            <a:off x="9299194" y="3455661"/>
+            <a:off x="9780852" y="3454451"/>
             <a:ext cx="470041" cy="276999"/>
           </a:xfrm>
           <a:prstGeom prst="rect">
@@ -3818,6 +3797,132 @@
             <a:r>
               <a:rPr lang="en-US" sz="1400" dirty="0"/>
               <a:t>requirement group</a:t>
+            </a:r>
+          </a:p>
+        </p:txBody>
+      </p:sp>
+      <p:sp>
+        <p:nvSpPr>
+          <p:cNvPr id="3" name="TextBox 2">
+            <a:extLst>
+              <a:ext uri="{FF2B5EF4-FFF2-40B4-BE49-F238E27FC236}">
+                <a16:creationId xmlns:a16="http://schemas.microsoft.com/office/drawing/2014/main" id="{F2139848-04E3-1785-23E3-5FF076EC0766}"/>
+              </a:ext>
+            </a:extLst>
+          </p:cNvPr>
+          <p:cNvSpPr txBox="1"/>
+          <p:nvPr/>
+        </p:nvSpPr>
+        <p:spPr>
+          <a:xfrm>
+            <a:off x="1133648" y="3685431"/>
+            <a:ext cx="1814246" cy="369332"/>
+          </a:xfrm>
+          <a:prstGeom prst="rect">
+            <a:avLst/>
+          </a:prstGeom>
+          <a:noFill/>
+          <a:ln w="19050">
+            <a:solidFill>
+              <a:srgbClr val="0070C0"/>
+            </a:solidFill>
+          </a:ln>
+        </p:spPr>
+        <p:txBody>
+          <a:bodyPr wrap="square" rtlCol="0">
+            <a:spAutoFit/>
+          </a:bodyPr>
+          <a:lstStyle/>
+          <a:p>
+            <a:pPr algn="ctr"/>
+            <a:r>
+              <a:rPr lang="en-US" dirty="0"/>
+              <a:t>IHE Profile</a:t>
+            </a:r>
+          </a:p>
+        </p:txBody>
+      </p:sp>
+      <p:cxnSp>
+        <p:nvCxnSpPr>
+          <p:cNvPr id="7" name="Connector: Elbow 6">
+            <a:extLst>
+              <a:ext uri="{FF2B5EF4-FFF2-40B4-BE49-F238E27FC236}">
+                <a16:creationId xmlns:a16="http://schemas.microsoft.com/office/drawing/2014/main" id="{001C474E-C65C-0892-05F6-5803BDAF36FC}"/>
+              </a:ext>
+            </a:extLst>
+          </p:cNvPr>
+          <p:cNvCxnSpPr>
+            <a:cxnSpLocks/>
+            <a:stCxn id="11" idx="2"/>
+            <a:endCxn id="3" idx="0"/>
+          </p:cNvCxnSpPr>
+          <p:nvPr/>
+        </p:nvCxnSpPr>
+        <p:spPr>
+          <a:xfrm rot="5400000">
+            <a:off x="3729138" y="1483173"/>
+            <a:ext cx="513892" cy="3890625"/>
+          </a:xfrm>
+          <a:prstGeom prst="bentConnector3">
+            <a:avLst>
+              <a:gd name="adj1" fmla="val 50000"/>
+            </a:avLst>
+          </a:prstGeom>
+          <a:ln w="12700">
+            <a:solidFill>
+              <a:schemeClr val="tx1"/>
+            </a:solidFill>
+            <a:headEnd type="triangle" w="med" len="med"/>
+            <a:tailEnd type="none" w="med" len="med"/>
+          </a:ln>
+        </p:spPr>
+        <p:style>
+          <a:lnRef idx="1">
+            <a:schemeClr val="accent1"/>
+          </a:lnRef>
+          <a:fillRef idx="0">
+            <a:schemeClr val="accent1"/>
+          </a:fillRef>
+          <a:effectRef idx="0">
+            <a:schemeClr val="accent1"/>
+          </a:effectRef>
+          <a:fontRef idx="minor">
+            <a:schemeClr val="tx1"/>
+          </a:fontRef>
+        </p:style>
+      </p:cxnSp>
+      <p:sp>
+        <p:nvSpPr>
+          <p:cNvPr id="27" name="TextBox 26">
+            <a:extLst>
+              <a:ext uri="{FF2B5EF4-FFF2-40B4-BE49-F238E27FC236}">
+                <a16:creationId xmlns:a16="http://schemas.microsoft.com/office/drawing/2014/main" id="{5C8795A8-1CC8-983B-3668-798E196131C1}"/>
+              </a:ext>
+            </a:extLst>
+          </p:cNvPr>
+          <p:cNvSpPr txBox="1"/>
+          <p:nvPr/>
+        </p:nvSpPr>
+        <p:spPr>
+          <a:xfrm>
+            <a:off x="1971374" y="3447007"/>
+            <a:ext cx="470041" cy="276999"/>
+          </a:xfrm>
+          <a:prstGeom prst="rect">
+            <a:avLst/>
+          </a:prstGeom>
+          <a:noFill/>
+        </p:spPr>
+        <p:txBody>
+          <a:bodyPr wrap="square" rtlCol="0">
+            <a:spAutoFit/>
+          </a:bodyPr>
+          <a:lstStyle/>
+          <a:p>
+            <a:pPr algn="ctr"/>
+            <a:r>
+              <a:rPr lang="en-US" sz="1200" dirty="0"/>
+              <a:t>0..1</a:t>
             </a:r>
           </a:p>
         </p:txBody>

</xml_diff>

<commit_message>
Integrated SDPi-P DP Content + Updated Requirements Model
Integrated the master branch, including the Discovery Proxy content
Updated the TF-1A requirements model
</commit_message>
<xml_diff>
--- a/sources/vol1-diagram-sdpi-req-types-model.pptx
+++ b/sources/vol1-diagram-sdpi-req-types-model.pptx
@@ -197,7 +197,7 @@
           <a:p>
             <a:fld id="{8D25072E-162D-46ED-A5CB-0F20C9B31254}" type="datetimeFigureOut">
               <a:rPr lang="en-US" smtClean="0"/>
-              <a:t>7/11/2024</a:t>
+              <a:t>9/4/2024</a:t>
             </a:fld>
             <a:endParaRPr lang="en-US"/>
           </a:p>
@@ -616,7 +616,7 @@
           <a:p>
             <a:fld id="{2EEC94F7-949D-476A-A216-B4C0495AF0A9}" type="datetime1">
               <a:rPr lang="en-US" smtClean="0"/>
-              <a:t>7/11/2024</a:t>
+              <a:t>9/4/2024</a:t>
             </a:fld>
             <a:endParaRPr lang="en-US" dirty="0"/>
           </a:p>
@@ -1197,7 +1197,7 @@
           <a:p>
             <a:fld id="{32177C7B-DB6C-4979-B431-8A70B6AA02C0}" type="datetime1">
               <a:rPr lang="en-US" smtClean="0"/>
-              <a:t>7/11/2024</a:t>
+              <a:t>9/4/2024</a:t>
             </a:fld>
             <a:endParaRPr lang="en-US"/>
           </a:p>
@@ -1470,7 +1470,7 @@
           <a:p>
             <a:fld id="{6988B30D-439E-4AB2-AA68-B23618995FD5}" type="datetime1">
               <a:rPr lang="en-US" smtClean="0"/>
-              <a:t>7/11/2024</a:t>
+              <a:t>9/4/2024</a:t>
             </a:fld>
             <a:endParaRPr lang="en-US"/>
           </a:p>
@@ -1890,7 +1890,7 @@
           <a:p>
             <a:fld id="{DCD80575-BBBA-48FF-AA29-1886450D5040}" type="datetime1">
               <a:rPr lang="en-US" smtClean="0"/>
-              <a:t>7/11/2024</a:t>
+              <a:t>9/4/2024</a:t>
             </a:fld>
             <a:endParaRPr lang="en-US"/>
           </a:p>
@@ -2044,7 +2044,7 @@
           <a:p>
             <a:fld id="{BC5FA200-2376-48FE-AF10-E289A555E233}" type="datetime1">
               <a:rPr lang="en-US" smtClean="0"/>
-              <a:t>7/11/2024</a:t>
+              <a:t>9/4/2024</a:t>
             </a:fld>
             <a:endParaRPr lang="en-US"/>
           </a:p>
@@ -2206,7 +2206,7 @@
           <a:p>
             <a:fld id="{5413C7E2-5F5A-44A4-9515-26CB28336B65}" type="datetime1">
               <a:rPr lang="en-US" smtClean="0"/>
-              <a:t>7/11/2024</a:t>
+              <a:t>9/4/2024</a:t>
             </a:fld>
             <a:endParaRPr lang="en-US" dirty="0"/>
           </a:p>
@@ -2455,7 +2455,7 @@
           <a:p>
             <a:fld id="{C2466822-F1C2-4EED-8632-36F6A3080457}" type="datetime1">
               <a:rPr lang="en-US" smtClean="0"/>
-              <a:t>7/11/2024</a:t>
+              <a:t>9/4/2024</a:t>
             </a:fld>
             <a:endParaRPr lang="en-US"/>
           </a:p>
@@ -2874,42 +2874,6 @@
       </p:grpSpPr>
       <p:sp>
         <p:nvSpPr>
-          <p:cNvPr id="10" name="TextBox 9">
-            <a:extLst>
-              <a:ext uri="{FF2B5EF4-FFF2-40B4-BE49-F238E27FC236}">
-                <a16:creationId xmlns:a16="http://schemas.microsoft.com/office/drawing/2014/main" id="{3134207D-0C52-4380-B399-0CB4B8ED8C71}"/>
-              </a:ext>
-            </a:extLst>
-          </p:cNvPr>
-          <p:cNvSpPr txBox="1"/>
-          <p:nvPr/>
-        </p:nvSpPr>
-        <p:spPr>
-          <a:xfrm>
-            <a:off x="3899629" y="3455808"/>
-            <a:ext cx="470041" cy="276999"/>
-          </a:xfrm>
-          <a:prstGeom prst="rect">
-            <a:avLst/>
-          </a:prstGeom>
-          <a:noFill/>
-        </p:spPr>
-        <p:txBody>
-          <a:bodyPr wrap="square" rtlCol="0">
-            <a:spAutoFit/>
-          </a:bodyPr>
-          <a:lstStyle/>
-          <a:p>
-            <a:pPr algn="ctr"/>
-            <a:r>
-              <a:rPr lang="en-US" sz="1200" dirty="0"/>
-              <a:t>0..1</a:t>
-            </a:r>
-          </a:p>
-        </p:txBody>
-      </p:sp>
-      <p:sp>
-        <p:nvSpPr>
           <p:cNvPr id="11" name="TextBox 10">
             <a:extLst>
               <a:ext uri="{FF2B5EF4-FFF2-40B4-BE49-F238E27FC236}">
@@ -2986,10 +2950,10 @@
       </p:sp>
       <p:sp>
         <p:nvSpPr>
-          <p:cNvPr id="14" name="TextBox 13">
-            <a:extLst>
-              <a:ext uri="{FF2B5EF4-FFF2-40B4-BE49-F238E27FC236}">
-                <a16:creationId xmlns:a16="http://schemas.microsoft.com/office/drawing/2014/main" id="{1A3F2FC5-49D1-4F9C-A1B4-C6D065693F16}"/>
+          <p:cNvPr id="38" name="TextBox 37">
+            <a:extLst>
+              <a:ext uri="{FF2B5EF4-FFF2-40B4-BE49-F238E27FC236}">
+                <a16:creationId xmlns:a16="http://schemas.microsoft.com/office/drawing/2014/main" id="{600CF396-FC40-4DBF-9CFD-C3BB3ACA457D}"/>
               </a:ext>
             </a:extLst>
           </p:cNvPr>
@@ -2998,8 +2962,8 @@
         </p:nvSpPr>
         <p:spPr>
           <a:xfrm>
-            <a:off x="3081730" y="3686641"/>
-            <a:ext cx="1814246" cy="369332"/>
+            <a:off x="8226823" y="2514718"/>
+            <a:ext cx="1935386" cy="646331"/>
           </a:xfrm>
           <a:prstGeom prst="rect">
             <a:avLst/>
@@ -3020,166 +2984,48 @@
             <a:pPr algn="ctr"/>
             <a:r>
               <a:rPr lang="en-US" dirty="0"/>
-              <a:t>Use Case Feature</a:t>
-            </a:r>
-          </a:p>
-        </p:txBody>
-      </p:sp>
-      <p:sp>
-        <p:nvSpPr>
-          <p:cNvPr id="15" name="TextBox 14">
-            <a:extLst>
-              <a:ext uri="{FF2B5EF4-FFF2-40B4-BE49-F238E27FC236}">
-                <a16:creationId xmlns:a16="http://schemas.microsoft.com/office/drawing/2014/main" id="{8D8D26C3-7A63-4BA0-9D44-8B92953F6F99}"/>
-              </a:ext>
-            </a:extLst>
-          </p:cNvPr>
-          <p:cNvSpPr txBox="1"/>
-          <p:nvPr/>
-        </p:nvSpPr>
-        <p:spPr>
-          <a:xfrm>
-            <a:off x="5026192" y="3687983"/>
-            <a:ext cx="1814246" cy="369332"/>
-          </a:xfrm>
-          <a:prstGeom prst="rect">
-            <a:avLst/>
-          </a:prstGeom>
-          <a:noFill/>
-          <a:ln w="19050">
-            <a:solidFill>
-              <a:srgbClr val="0070C0"/>
-            </a:solidFill>
-          </a:ln>
-        </p:spPr>
-        <p:txBody>
-          <a:bodyPr wrap="square" rtlCol="0">
-            <a:spAutoFit/>
-          </a:bodyPr>
-          <a:lstStyle/>
+              <a:t>Requirement </a:t>
+            </a:r>
+          </a:p>
           <a:p>
             <a:pPr algn="ctr"/>
             <a:r>
               <a:rPr lang="en-US" dirty="0"/>
-              <a:t>Ref. Standard ICS</a:t>
-            </a:r>
-          </a:p>
-        </p:txBody>
-      </p:sp>
-      <p:sp>
-        <p:nvSpPr>
-          <p:cNvPr id="16" name="TextBox 15">
-            <a:extLst>
-              <a:ext uri="{FF2B5EF4-FFF2-40B4-BE49-F238E27FC236}">
-                <a16:creationId xmlns:a16="http://schemas.microsoft.com/office/drawing/2014/main" id="{77AE7BC2-BE92-4F2F-9FDD-F559E2A09691}"/>
-              </a:ext>
-            </a:extLst>
-          </p:cNvPr>
-          <p:cNvSpPr txBox="1"/>
-          <p:nvPr/>
-        </p:nvSpPr>
-        <p:spPr>
-          <a:xfrm>
-            <a:off x="6968734" y="3693336"/>
-            <a:ext cx="1814246" cy="369332"/>
-          </a:xfrm>
-          <a:prstGeom prst="rect">
-            <a:avLst/>
-          </a:prstGeom>
-          <a:noFill/>
-          <a:ln w="19050">
-            <a:solidFill>
-              <a:srgbClr val="0070C0"/>
-            </a:solidFill>
-          </a:ln>
-        </p:spPr>
-        <p:txBody>
-          <a:bodyPr wrap="square" rtlCol="0">
-            <a:spAutoFit/>
-          </a:bodyPr>
-          <a:lstStyle/>
-          <a:p>
-            <a:pPr algn="ctr"/>
-            <a:r>
-              <a:rPr lang="en-US" dirty="0"/>
-              <a:t>SES</a:t>
-            </a:r>
-          </a:p>
-        </p:txBody>
-      </p:sp>
-      <p:sp>
-        <p:nvSpPr>
-          <p:cNvPr id="17" name="TextBox 16">
-            <a:extLst>
-              <a:ext uri="{FF2B5EF4-FFF2-40B4-BE49-F238E27FC236}">
-                <a16:creationId xmlns:a16="http://schemas.microsoft.com/office/drawing/2014/main" id="{18F293B5-629D-4350-9255-9BECC92BE714}"/>
-              </a:ext>
-            </a:extLst>
-          </p:cNvPr>
-          <p:cNvSpPr txBox="1"/>
-          <p:nvPr/>
-        </p:nvSpPr>
-        <p:spPr>
-          <a:xfrm>
-            <a:off x="8911276" y="3685432"/>
-            <a:ext cx="1814246" cy="369332"/>
-          </a:xfrm>
-          <a:prstGeom prst="rect">
-            <a:avLst/>
-          </a:prstGeom>
-          <a:noFill/>
-          <a:ln w="19050">
-            <a:solidFill>
-              <a:srgbClr val="0070C0"/>
-            </a:solidFill>
-          </a:ln>
-        </p:spPr>
-        <p:txBody>
-          <a:bodyPr wrap="square" rtlCol="0">
-            <a:spAutoFit/>
-          </a:bodyPr>
-          <a:lstStyle/>
-          <a:p>
-            <a:pPr algn="ctr"/>
-            <a:r>
-              <a:rPr lang="en-US" dirty="0"/>
-              <a:t>Tech Feature</a:t>
+              <a:t>Fulfillment</a:t>
             </a:r>
           </a:p>
         </p:txBody>
       </p:sp>
       <p:cxnSp>
         <p:nvCxnSpPr>
-          <p:cNvPr id="18" name="Connector: Elbow 17">
-            <a:extLst>
-              <a:ext uri="{FF2B5EF4-FFF2-40B4-BE49-F238E27FC236}">
-                <a16:creationId xmlns:a16="http://schemas.microsoft.com/office/drawing/2014/main" id="{F95BEFEB-8155-48DC-B48C-607C1265C2A6}"/>
+          <p:cNvPr id="39" name="Straight Arrow Connector 38">
+            <a:extLst>
+              <a:ext uri="{FF2B5EF4-FFF2-40B4-BE49-F238E27FC236}">
+                <a16:creationId xmlns:a16="http://schemas.microsoft.com/office/drawing/2014/main" id="{9C76BD85-A956-4309-AA31-D5E1DBDC9785}"/>
               </a:ext>
             </a:extLst>
           </p:cNvPr>
           <p:cNvCxnSpPr>
             <a:cxnSpLocks/>
-            <a:stCxn id="11" idx="2"/>
-            <a:endCxn id="14" idx="0"/>
+            <a:stCxn id="38" idx="1"/>
+            <a:endCxn id="11" idx="3"/>
           </p:cNvCxnSpPr>
           <p:nvPr/>
         </p:nvCxnSpPr>
         <p:spPr>
-          <a:xfrm rot="5400000">
-            <a:off x="4702574" y="2457819"/>
-            <a:ext cx="515102" cy="1942543"/>
-          </a:xfrm>
-          <a:prstGeom prst="bentConnector3">
-            <a:avLst>
-              <a:gd name="adj1" fmla="val 50000"/>
-            </a:avLst>
+          <a:xfrm flipH="1">
+            <a:off x="6899089" y="2837884"/>
+            <a:ext cx="1327734" cy="10490"/>
+          </a:xfrm>
+          <a:prstGeom prst="straightConnector1">
+            <a:avLst/>
           </a:prstGeom>
           <a:ln w="12700">
             <a:solidFill>
               <a:schemeClr val="tx1"/>
             </a:solidFill>
-            <a:headEnd type="triangle" w="med" len="med"/>
-            <a:tailEnd type="none" w="med" len="med"/>
+            <a:headEnd type="none" w="med" len="med"/>
+            <a:tailEnd type="arrow" w="med" len="med"/>
           </a:ln>
         </p:spPr>
         <p:style>
@@ -3197,38 +3043,144 @@
           </a:fontRef>
         </p:style>
       </p:cxnSp>
+      <p:sp>
+        <p:nvSpPr>
+          <p:cNvPr id="43" name="TextBox 42">
+            <a:extLst>
+              <a:ext uri="{FF2B5EF4-FFF2-40B4-BE49-F238E27FC236}">
+                <a16:creationId xmlns:a16="http://schemas.microsoft.com/office/drawing/2014/main" id="{A83C4106-1FE4-4B73-AFC6-3F8BB6D9A006}"/>
+              </a:ext>
+            </a:extLst>
+          </p:cNvPr>
+          <p:cNvSpPr txBox="1"/>
+          <p:nvPr/>
+        </p:nvSpPr>
+        <p:spPr>
+          <a:xfrm>
+            <a:off x="6827727" y="2577213"/>
+            <a:ext cx="470041" cy="276999"/>
+          </a:xfrm>
+          <a:prstGeom prst="rect">
+            <a:avLst/>
+          </a:prstGeom>
+          <a:noFill/>
+        </p:spPr>
+        <p:txBody>
+          <a:bodyPr wrap="square" rtlCol="0">
+            <a:spAutoFit/>
+          </a:bodyPr>
+          <a:lstStyle/>
+          <a:p>
+            <a:pPr algn="ctr"/>
+            <a:r>
+              <a:rPr lang="en-US" sz="1200" dirty="0"/>
+              <a:t>1..*</a:t>
+            </a:r>
+          </a:p>
+        </p:txBody>
+      </p:sp>
+      <p:sp>
+        <p:nvSpPr>
+          <p:cNvPr id="44" name="TextBox 43">
+            <a:extLst>
+              <a:ext uri="{FF2B5EF4-FFF2-40B4-BE49-F238E27FC236}">
+                <a16:creationId xmlns:a16="http://schemas.microsoft.com/office/drawing/2014/main" id="{A4B9659B-20CA-43A7-8D92-DED1981EED4C}"/>
+              </a:ext>
+            </a:extLst>
+          </p:cNvPr>
+          <p:cNvSpPr txBox="1"/>
+          <p:nvPr/>
+        </p:nvSpPr>
+        <p:spPr>
+          <a:xfrm>
+            <a:off x="7845687" y="2852784"/>
+            <a:ext cx="470041" cy="276999"/>
+          </a:xfrm>
+          <a:prstGeom prst="rect">
+            <a:avLst/>
+          </a:prstGeom>
+          <a:noFill/>
+        </p:spPr>
+        <p:txBody>
+          <a:bodyPr wrap="square" rtlCol="0">
+            <a:spAutoFit/>
+          </a:bodyPr>
+          <a:lstStyle/>
+          <a:p>
+            <a:pPr algn="ctr"/>
+            <a:r>
+              <a:rPr lang="en-US" sz="1200" dirty="0"/>
+              <a:t>0..*</a:t>
+            </a:r>
+          </a:p>
+        </p:txBody>
+      </p:sp>
+      <p:sp>
+        <p:nvSpPr>
+          <p:cNvPr id="2" name="TextBox 1">
+            <a:extLst>
+              <a:ext uri="{FF2B5EF4-FFF2-40B4-BE49-F238E27FC236}">
+                <a16:creationId xmlns:a16="http://schemas.microsoft.com/office/drawing/2014/main" id="{8D3D3018-D266-5AC4-50BB-C4F80D42E7CF}"/>
+              </a:ext>
+            </a:extLst>
+          </p:cNvPr>
+          <p:cNvSpPr txBox="1"/>
+          <p:nvPr/>
+        </p:nvSpPr>
+        <p:spPr>
+          <a:xfrm>
+            <a:off x="6463705" y="2196792"/>
+            <a:ext cx="870767" cy="307777"/>
+          </a:xfrm>
+          <a:prstGeom prst="rect">
+            <a:avLst/>
+          </a:prstGeom>
+          <a:noFill/>
+        </p:spPr>
+        <p:txBody>
+          <a:bodyPr wrap="square" rtlCol="0">
+            <a:spAutoFit/>
+          </a:bodyPr>
+          <a:lstStyle/>
+          <a:p>
+            <a:pPr algn="ctr"/>
+            <a:r>
+              <a:rPr lang="en-US" sz="1400" dirty="0"/>
+              <a:t>satisfies</a:t>
+            </a:r>
+          </a:p>
+        </p:txBody>
+      </p:sp>
       <p:cxnSp>
         <p:nvCxnSpPr>
-          <p:cNvPr id="19" name="Connector: Elbow 18">
-            <a:extLst>
-              <a:ext uri="{FF2B5EF4-FFF2-40B4-BE49-F238E27FC236}">
-                <a16:creationId xmlns:a16="http://schemas.microsoft.com/office/drawing/2014/main" id="{C8BFCB68-1E66-467C-A6C1-3CB87B58AE29}"/>
+          <p:cNvPr id="4" name="Connector: Elbow 3">
+            <a:extLst>
+              <a:ext uri="{FF2B5EF4-FFF2-40B4-BE49-F238E27FC236}">
+                <a16:creationId xmlns:a16="http://schemas.microsoft.com/office/drawing/2014/main" id="{3A280D7C-07F9-945E-1A22-A2319C7CD28A}"/>
               </a:ext>
             </a:extLst>
           </p:cNvPr>
           <p:cNvCxnSpPr>
             <a:cxnSpLocks/>
-            <a:stCxn id="11" idx="2"/>
-            <a:endCxn id="15" idx="0"/>
+            <a:stCxn id="11" idx="1"/>
+            <a:endCxn id="11" idx="0"/>
           </p:cNvCxnSpPr>
           <p:nvPr/>
         </p:nvCxnSpPr>
         <p:spPr>
-          <a:xfrm rot="16200000" flipH="1">
-            <a:off x="5674133" y="3428801"/>
-            <a:ext cx="516444" cy="1919"/>
-          </a:xfrm>
-          <a:prstGeom prst="bentConnector3">
+          <a:xfrm rot="10800000" flipH="1">
+            <a:off x="4963702" y="2525208"/>
+            <a:ext cx="967693" cy="323166"/>
+          </a:xfrm>
+          <a:prstGeom prst="bentConnector4">
             <a:avLst>
-              <a:gd name="adj1" fmla="val 50000"/>
+              <a:gd name="adj1" fmla="val -23623"/>
+              <a:gd name="adj2" fmla="val 170738"/>
             </a:avLst>
           </a:prstGeom>
-          <a:ln w="12700">
-            <a:solidFill>
-              <a:schemeClr val="tx1"/>
-            </a:solidFill>
+          <a:ln w="15875">
             <a:headEnd type="triangle" w="med" len="med"/>
-            <a:tailEnd type="none" w="med" len="med"/>
+            <a:tailEnd type="triangle" w="med" len="med"/>
           </a:ln>
         </p:spPr>
         <p:style>
@@ -3246,110 +3198,12 @@
           </a:fontRef>
         </p:style>
       </p:cxnSp>
-      <p:cxnSp>
-        <p:nvCxnSpPr>
-          <p:cNvPr id="20" name="Connector: Elbow 19">
-            <a:extLst>
-              <a:ext uri="{FF2B5EF4-FFF2-40B4-BE49-F238E27FC236}">
-                <a16:creationId xmlns:a16="http://schemas.microsoft.com/office/drawing/2014/main" id="{6AB30C9A-0FA3-4E26-8425-277E3DE56886}"/>
-              </a:ext>
-            </a:extLst>
-          </p:cNvPr>
-          <p:cNvCxnSpPr>
-            <a:cxnSpLocks/>
-            <a:stCxn id="11" idx="2"/>
-            <a:endCxn id="16" idx="0"/>
-          </p:cNvCxnSpPr>
-          <p:nvPr/>
-        </p:nvCxnSpPr>
-        <p:spPr>
-          <a:xfrm rot="16200000" flipH="1">
-            <a:off x="6642728" y="2460206"/>
-            <a:ext cx="521797" cy="1944461"/>
-          </a:xfrm>
-          <a:prstGeom prst="bentConnector3">
-            <a:avLst>
-              <a:gd name="adj1" fmla="val 50000"/>
-            </a:avLst>
-          </a:prstGeom>
-          <a:ln w="12700">
-            <a:solidFill>
-              <a:schemeClr val="tx1"/>
-            </a:solidFill>
-            <a:headEnd type="triangle" w="med" len="med"/>
-            <a:tailEnd type="none" w="med" len="med"/>
-          </a:ln>
-        </p:spPr>
-        <p:style>
-          <a:lnRef idx="1">
-            <a:schemeClr val="accent1"/>
-          </a:lnRef>
-          <a:fillRef idx="0">
-            <a:schemeClr val="accent1"/>
-          </a:fillRef>
-          <a:effectRef idx="0">
-            <a:schemeClr val="accent1"/>
-          </a:effectRef>
-          <a:fontRef idx="minor">
-            <a:schemeClr val="tx1"/>
-          </a:fontRef>
-        </p:style>
-      </p:cxnSp>
-      <p:cxnSp>
-        <p:nvCxnSpPr>
-          <p:cNvPr id="21" name="Connector: Elbow 20">
-            <a:extLst>
-              <a:ext uri="{FF2B5EF4-FFF2-40B4-BE49-F238E27FC236}">
-                <a16:creationId xmlns:a16="http://schemas.microsoft.com/office/drawing/2014/main" id="{E78A7934-6EB3-4117-A131-4A45BE6B57AB}"/>
-              </a:ext>
-            </a:extLst>
-          </p:cNvPr>
-          <p:cNvCxnSpPr>
-            <a:cxnSpLocks/>
-            <a:stCxn id="11" idx="2"/>
-            <a:endCxn id="17" idx="0"/>
-          </p:cNvCxnSpPr>
-          <p:nvPr/>
-        </p:nvCxnSpPr>
-        <p:spPr>
-          <a:xfrm rot="16200000" flipH="1">
-            <a:off x="7617951" y="1484983"/>
-            <a:ext cx="513893" cy="3887003"/>
-          </a:xfrm>
-          <a:prstGeom prst="bentConnector3">
-            <a:avLst>
-              <a:gd name="adj1" fmla="val 50000"/>
-            </a:avLst>
-          </a:prstGeom>
-          <a:ln w="12700">
-            <a:solidFill>
-              <a:schemeClr val="tx1"/>
-            </a:solidFill>
-            <a:headEnd type="triangle" w="med" len="med"/>
-            <a:tailEnd type="none" w="med" len="med"/>
-          </a:ln>
-        </p:spPr>
-        <p:style>
-          <a:lnRef idx="1">
-            <a:schemeClr val="accent1"/>
-          </a:lnRef>
-          <a:fillRef idx="0">
-            <a:schemeClr val="accent1"/>
-          </a:fillRef>
-          <a:effectRef idx="0">
-            <a:schemeClr val="accent1"/>
-          </a:effectRef>
-          <a:fontRef idx="minor">
-            <a:schemeClr val="tx1"/>
-          </a:fontRef>
-        </p:style>
-      </p:cxnSp>
-      <p:sp>
-        <p:nvSpPr>
-          <p:cNvPr id="22" name="TextBox 21">
-            <a:extLst>
-              <a:ext uri="{FF2B5EF4-FFF2-40B4-BE49-F238E27FC236}">
-                <a16:creationId xmlns:a16="http://schemas.microsoft.com/office/drawing/2014/main" id="{84060A6D-A7F8-40D1-A91F-2AEF7A638957}"/>
+      <p:sp>
+        <p:nvSpPr>
+          <p:cNvPr id="5" name="TextBox 4">
+            <a:extLst>
+              <a:ext uri="{FF2B5EF4-FFF2-40B4-BE49-F238E27FC236}">
+                <a16:creationId xmlns:a16="http://schemas.microsoft.com/office/drawing/2014/main" id="{355F2B92-AD06-F4AE-CC2B-68D96693BA4E}"/>
               </a:ext>
             </a:extLst>
           </p:cNvPr>
@@ -3358,8 +3212,8 @@
         </p:nvSpPr>
         <p:spPr>
           <a:xfrm>
-            <a:off x="5883608" y="3192178"/>
-            <a:ext cx="688504" cy="276999"/>
+            <a:off x="5567690" y="2271738"/>
+            <a:ext cx="470041" cy="276999"/>
           </a:xfrm>
           <a:prstGeom prst="rect">
             <a:avLst/>
@@ -3375,17 +3229,17 @@
             <a:pPr algn="ctr"/>
             <a:r>
               <a:rPr lang="en-US" sz="1200" dirty="0"/>
-              <a:t>“is a”</a:t>
-            </a:r>
-          </a:p>
-        </p:txBody>
-      </p:sp>
-      <p:sp>
-        <p:nvSpPr>
-          <p:cNvPr id="23" name="TextBox 22">
-            <a:extLst>
-              <a:ext uri="{FF2B5EF4-FFF2-40B4-BE49-F238E27FC236}">
-                <a16:creationId xmlns:a16="http://schemas.microsoft.com/office/drawing/2014/main" id="{DB1F8305-0822-4BE5-9B61-AE1397EB5D1D}"/>
+              <a:t>0..*</a:t>
+            </a:r>
+          </a:p>
+        </p:txBody>
+      </p:sp>
+      <p:sp>
+        <p:nvSpPr>
+          <p:cNvPr id="8" name="TextBox 7">
+            <a:extLst>
+              <a:ext uri="{FF2B5EF4-FFF2-40B4-BE49-F238E27FC236}">
+                <a16:creationId xmlns:a16="http://schemas.microsoft.com/office/drawing/2014/main" id="{78049040-9709-544F-8704-030D25765EAB}"/>
               </a:ext>
             </a:extLst>
           </p:cNvPr>
@@ -3394,8 +3248,8 @@
         </p:nvSpPr>
         <p:spPr>
           <a:xfrm>
-            <a:off x="5871823" y="3455661"/>
-            <a:ext cx="470041" cy="276999"/>
+            <a:off x="4048439" y="2624792"/>
+            <a:ext cx="679898" cy="307777"/>
           </a:xfrm>
           <a:prstGeom prst="rect">
             <a:avLst/>
@@ -3408,20 +3262,701 @@
           </a:bodyPr>
           <a:lstStyle/>
           <a:p>
-            <a:pPr algn="ctr"/>
-            <a:r>
-              <a:rPr lang="en-US" sz="1200" dirty="0"/>
-              <a:t>0..1</a:t>
-            </a:r>
-          </a:p>
-        </p:txBody>
-      </p:sp>
-      <p:sp>
-        <p:nvSpPr>
-          <p:cNvPr id="24" name="TextBox 23">
-            <a:extLst>
-              <a:ext uri="{FF2B5EF4-FFF2-40B4-BE49-F238E27FC236}">
-                <a16:creationId xmlns:a16="http://schemas.microsoft.com/office/drawing/2014/main" id="{211159A5-A3ED-4C12-9F2C-87D773F19BF9}"/>
+            <a:r>
+              <a:rPr lang="en-US" sz="1400" dirty="0"/>
+              <a:t>parent</a:t>
+            </a:r>
+          </a:p>
+        </p:txBody>
+      </p:sp>
+      <p:grpSp>
+        <p:nvGrpSpPr>
+          <p:cNvPr id="26" name="Group 25">
+            <a:extLst>
+              <a:ext uri="{FF2B5EF4-FFF2-40B4-BE49-F238E27FC236}">
+                <a16:creationId xmlns:a16="http://schemas.microsoft.com/office/drawing/2014/main" id="{8CDE9592-E21F-3CE0-2562-FBF21C97A4AD}"/>
+              </a:ext>
+            </a:extLst>
+          </p:cNvPr>
+          <p:cNvGrpSpPr/>
+          <p:nvPr/>
+        </p:nvGrpSpPr>
+        <p:grpSpPr>
+          <a:xfrm>
+            <a:off x="1133648" y="3186612"/>
+            <a:ext cx="9591874" cy="891130"/>
+            <a:chOff x="1133648" y="3613665"/>
+            <a:chExt cx="9591874" cy="891130"/>
+          </a:xfrm>
+        </p:grpSpPr>
+        <p:sp>
+          <p:nvSpPr>
+            <p:cNvPr id="10" name="TextBox 9">
+              <a:extLst>
+                <a:ext uri="{FF2B5EF4-FFF2-40B4-BE49-F238E27FC236}">
+                  <a16:creationId xmlns:a16="http://schemas.microsoft.com/office/drawing/2014/main" id="{3134207D-0C52-4380-B399-0CB4B8ED8C71}"/>
+                </a:ext>
+              </a:extLst>
+            </p:cNvPr>
+            <p:cNvSpPr txBox="1"/>
+            <p:nvPr/>
+          </p:nvSpPr>
+          <p:spPr>
+            <a:xfrm>
+              <a:off x="3899629" y="3897935"/>
+              <a:ext cx="470041" cy="276999"/>
+            </a:xfrm>
+            <a:prstGeom prst="rect">
+              <a:avLst/>
+            </a:prstGeom>
+            <a:noFill/>
+          </p:spPr>
+          <p:txBody>
+            <a:bodyPr wrap="square" rtlCol="0">
+              <a:spAutoFit/>
+            </a:bodyPr>
+            <a:lstStyle/>
+            <a:p>
+              <a:pPr algn="ctr"/>
+              <a:r>
+                <a:rPr lang="en-US" sz="1200" dirty="0"/>
+                <a:t>0..1</a:t>
+              </a:r>
+            </a:p>
+          </p:txBody>
+        </p:sp>
+        <p:sp>
+          <p:nvSpPr>
+            <p:cNvPr id="14" name="TextBox 13">
+              <a:extLst>
+                <a:ext uri="{FF2B5EF4-FFF2-40B4-BE49-F238E27FC236}">
+                  <a16:creationId xmlns:a16="http://schemas.microsoft.com/office/drawing/2014/main" id="{1A3F2FC5-49D1-4F9C-A1B4-C6D065693F16}"/>
+                </a:ext>
+              </a:extLst>
+            </p:cNvPr>
+            <p:cNvSpPr txBox="1"/>
+            <p:nvPr/>
+          </p:nvSpPr>
+          <p:spPr>
+            <a:xfrm>
+              <a:off x="3081730" y="4128768"/>
+              <a:ext cx="1814246" cy="369332"/>
+            </a:xfrm>
+            <a:prstGeom prst="rect">
+              <a:avLst/>
+            </a:prstGeom>
+            <a:noFill/>
+            <a:ln w="19050">
+              <a:solidFill>
+                <a:srgbClr val="0070C0"/>
+              </a:solidFill>
+            </a:ln>
+          </p:spPr>
+          <p:txBody>
+            <a:bodyPr wrap="square" rtlCol="0">
+              <a:spAutoFit/>
+            </a:bodyPr>
+            <a:lstStyle/>
+            <a:p>
+              <a:pPr algn="ctr"/>
+              <a:r>
+                <a:rPr lang="en-US" dirty="0"/>
+                <a:t>Use Case Feature</a:t>
+              </a:r>
+            </a:p>
+          </p:txBody>
+        </p:sp>
+        <p:sp>
+          <p:nvSpPr>
+            <p:cNvPr id="15" name="TextBox 14">
+              <a:extLst>
+                <a:ext uri="{FF2B5EF4-FFF2-40B4-BE49-F238E27FC236}">
+                  <a16:creationId xmlns:a16="http://schemas.microsoft.com/office/drawing/2014/main" id="{8D8D26C3-7A63-4BA0-9D44-8B92953F6F99}"/>
+                </a:ext>
+              </a:extLst>
+            </p:cNvPr>
+            <p:cNvSpPr txBox="1"/>
+            <p:nvPr/>
+          </p:nvSpPr>
+          <p:spPr>
+            <a:xfrm>
+              <a:off x="5026192" y="4130110"/>
+              <a:ext cx="1814246" cy="369332"/>
+            </a:xfrm>
+            <a:prstGeom prst="rect">
+              <a:avLst/>
+            </a:prstGeom>
+            <a:noFill/>
+            <a:ln w="19050">
+              <a:solidFill>
+                <a:srgbClr val="0070C0"/>
+              </a:solidFill>
+            </a:ln>
+          </p:spPr>
+          <p:txBody>
+            <a:bodyPr wrap="square" rtlCol="0">
+              <a:spAutoFit/>
+            </a:bodyPr>
+            <a:lstStyle/>
+            <a:p>
+              <a:pPr algn="ctr"/>
+              <a:r>
+                <a:rPr lang="en-US" dirty="0"/>
+                <a:t>Ref. Standard ICS</a:t>
+              </a:r>
+            </a:p>
+          </p:txBody>
+        </p:sp>
+        <p:sp>
+          <p:nvSpPr>
+            <p:cNvPr id="16" name="TextBox 15">
+              <a:extLst>
+                <a:ext uri="{FF2B5EF4-FFF2-40B4-BE49-F238E27FC236}">
+                  <a16:creationId xmlns:a16="http://schemas.microsoft.com/office/drawing/2014/main" id="{77AE7BC2-BE92-4F2F-9FDD-F559E2A09691}"/>
+                </a:ext>
+              </a:extLst>
+            </p:cNvPr>
+            <p:cNvSpPr txBox="1"/>
+            <p:nvPr/>
+          </p:nvSpPr>
+          <p:spPr>
+            <a:xfrm>
+              <a:off x="6968734" y="4135463"/>
+              <a:ext cx="1814246" cy="369332"/>
+            </a:xfrm>
+            <a:prstGeom prst="rect">
+              <a:avLst/>
+            </a:prstGeom>
+            <a:noFill/>
+            <a:ln w="19050">
+              <a:solidFill>
+                <a:srgbClr val="0070C0"/>
+              </a:solidFill>
+            </a:ln>
+          </p:spPr>
+          <p:txBody>
+            <a:bodyPr wrap="square" rtlCol="0">
+              <a:spAutoFit/>
+            </a:bodyPr>
+            <a:lstStyle/>
+            <a:p>
+              <a:pPr algn="ctr"/>
+              <a:r>
+                <a:rPr lang="en-US" dirty="0"/>
+                <a:t>SES</a:t>
+              </a:r>
+            </a:p>
+          </p:txBody>
+        </p:sp>
+        <p:sp>
+          <p:nvSpPr>
+            <p:cNvPr id="17" name="TextBox 16">
+              <a:extLst>
+                <a:ext uri="{FF2B5EF4-FFF2-40B4-BE49-F238E27FC236}">
+                  <a16:creationId xmlns:a16="http://schemas.microsoft.com/office/drawing/2014/main" id="{18F293B5-629D-4350-9255-9BECC92BE714}"/>
+                </a:ext>
+              </a:extLst>
+            </p:cNvPr>
+            <p:cNvSpPr txBox="1"/>
+            <p:nvPr/>
+          </p:nvSpPr>
+          <p:spPr>
+            <a:xfrm>
+              <a:off x="8911276" y="4127559"/>
+              <a:ext cx="1814246" cy="369332"/>
+            </a:xfrm>
+            <a:prstGeom prst="rect">
+              <a:avLst/>
+            </a:prstGeom>
+            <a:noFill/>
+            <a:ln w="19050">
+              <a:solidFill>
+                <a:srgbClr val="0070C0"/>
+              </a:solidFill>
+            </a:ln>
+          </p:spPr>
+          <p:txBody>
+            <a:bodyPr wrap="square" rtlCol="0">
+              <a:spAutoFit/>
+            </a:bodyPr>
+            <a:lstStyle/>
+            <a:p>
+              <a:pPr algn="ctr"/>
+              <a:r>
+                <a:rPr lang="en-US" dirty="0"/>
+                <a:t>Tech Feature</a:t>
+              </a:r>
+            </a:p>
+          </p:txBody>
+        </p:sp>
+        <p:cxnSp>
+          <p:nvCxnSpPr>
+            <p:cNvPr id="18" name="Connector: Elbow 17">
+              <a:extLst>
+                <a:ext uri="{FF2B5EF4-FFF2-40B4-BE49-F238E27FC236}">
+                  <a16:creationId xmlns:a16="http://schemas.microsoft.com/office/drawing/2014/main" id="{F95BEFEB-8155-48DC-B48C-607C1265C2A6}"/>
+                </a:ext>
+              </a:extLst>
+            </p:cNvPr>
+            <p:cNvCxnSpPr>
+              <a:cxnSpLocks/>
+              <a:endCxn id="14" idx="0"/>
+            </p:cNvCxnSpPr>
+            <p:nvPr/>
+          </p:nvCxnSpPr>
+          <p:spPr>
+            <a:xfrm rot="5400000">
+              <a:off x="4702574" y="2899946"/>
+              <a:ext cx="515102" cy="1942543"/>
+            </a:xfrm>
+            <a:prstGeom prst="bentConnector3">
+              <a:avLst>
+                <a:gd name="adj1" fmla="val 50000"/>
+              </a:avLst>
+            </a:prstGeom>
+            <a:ln w="12700">
+              <a:solidFill>
+                <a:schemeClr val="tx1"/>
+              </a:solidFill>
+              <a:headEnd type="triangle" w="med" len="med"/>
+              <a:tailEnd type="none" w="med" len="med"/>
+            </a:ln>
+          </p:spPr>
+          <p:style>
+            <a:lnRef idx="1">
+              <a:schemeClr val="accent1"/>
+            </a:lnRef>
+            <a:fillRef idx="0">
+              <a:schemeClr val="accent1"/>
+            </a:fillRef>
+            <a:effectRef idx="0">
+              <a:schemeClr val="accent1"/>
+            </a:effectRef>
+            <a:fontRef idx="minor">
+              <a:schemeClr val="tx1"/>
+            </a:fontRef>
+          </p:style>
+        </p:cxnSp>
+        <p:cxnSp>
+          <p:nvCxnSpPr>
+            <p:cNvPr id="19" name="Connector: Elbow 18">
+              <a:extLst>
+                <a:ext uri="{FF2B5EF4-FFF2-40B4-BE49-F238E27FC236}">
+                  <a16:creationId xmlns:a16="http://schemas.microsoft.com/office/drawing/2014/main" id="{C8BFCB68-1E66-467C-A6C1-3CB87B58AE29}"/>
+                </a:ext>
+              </a:extLst>
+            </p:cNvPr>
+            <p:cNvCxnSpPr>
+              <a:cxnSpLocks/>
+              <a:endCxn id="15" idx="0"/>
+            </p:cNvCxnSpPr>
+            <p:nvPr/>
+          </p:nvCxnSpPr>
+          <p:spPr>
+            <a:xfrm rot="16200000" flipH="1">
+              <a:off x="5674133" y="3870928"/>
+              <a:ext cx="516444" cy="1919"/>
+            </a:xfrm>
+            <a:prstGeom prst="bentConnector3">
+              <a:avLst>
+                <a:gd name="adj1" fmla="val 50000"/>
+              </a:avLst>
+            </a:prstGeom>
+            <a:ln w="12700">
+              <a:solidFill>
+                <a:schemeClr val="tx1"/>
+              </a:solidFill>
+              <a:headEnd type="triangle" w="med" len="med"/>
+              <a:tailEnd type="none" w="med" len="med"/>
+            </a:ln>
+          </p:spPr>
+          <p:style>
+            <a:lnRef idx="1">
+              <a:schemeClr val="accent1"/>
+            </a:lnRef>
+            <a:fillRef idx="0">
+              <a:schemeClr val="accent1"/>
+            </a:fillRef>
+            <a:effectRef idx="0">
+              <a:schemeClr val="accent1"/>
+            </a:effectRef>
+            <a:fontRef idx="minor">
+              <a:schemeClr val="tx1"/>
+            </a:fontRef>
+          </p:style>
+        </p:cxnSp>
+        <p:cxnSp>
+          <p:nvCxnSpPr>
+            <p:cNvPr id="20" name="Connector: Elbow 19">
+              <a:extLst>
+                <a:ext uri="{FF2B5EF4-FFF2-40B4-BE49-F238E27FC236}">
+                  <a16:creationId xmlns:a16="http://schemas.microsoft.com/office/drawing/2014/main" id="{6AB30C9A-0FA3-4E26-8425-277E3DE56886}"/>
+                </a:ext>
+              </a:extLst>
+            </p:cNvPr>
+            <p:cNvCxnSpPr>
+              <a:cxnSpLocks/>
+              <a:endCxn id="16" idx="0"/>
+            </p:cNvCxnSpPr>
+            <p:nvPr/>
+          </p:nvCxnSpPr>
+          <p:spPr>
+            <a:xfrm rot="16200000" flipH="1">
+              <a:off x="6642728" y="2902333"/>
+              <a:ext cx="521797" cy="1944461"/>
+            </a:xfrm>
+            <a:prstGeom prst="bentConnector3">
+              <a:avLst>
+                <a:gd name="adj1" fmla="val 50000"/>
+              </a:avLst>
+            </a:prstGeom>
+            <a:ln w="12700">
+              <a:solidFill>
+                <a:schemeClr val="tx1"/>
+              </a:solidFill>
+              <a:headEnd type="triangle" w="med" len="med"/>
+              <a:tailEnd type="none" w="med" len="med"/>
+            </a:ln>
+          </p:spPr>
+          <p:style>
+            <a:lnRef idx="1">
+              <a:schemeClr val="accent1"/>
+            </a:lnRef>
+            <a:fillRef idx="0">
+              <a:schemeClr val="accent1"/>
+            </a:fillRef>
+            <a:effectRef idx="0">
+              <a:schemeClr val="accent1"/>
+            </a:effectRef>
+            <a:fontRef idx="minor">
+              <a:schemeClr val="tx1"/>
+            </a:fontRef>
+          </p:style>
+        </p:cxnSp>
+        <p:cxnSp>
+          <p:nvCxnSpPr>
+            <p:cNvPr id="21" name="Connector: Elbow 20">
+              <a:extLst>
+                <a:ext uri="{FF2B5EF4-FFF2-40B4-BE49-F238E27FC236}">
+                  <a16:creationId xmlns:a16="http://schemas.microsoft.com/office/drawing/2014/main" id="{E78A7934-6EB3-4117-A131-4A45BE6B57AB}"/>
+                </a:ext>
+              </a:extLst>
+            </p:cNvPr>
+            <p:cNvCxnSpPr>
+              <a:cxnSpLocks/>
+              <a:endCxn id="17" idx="0"/>
+            </p:cNvCxnSpPr>
+            <p:nvPr/>
+          </p:nvCxnSpPr>
+          <p:spPr>
+            <a:xfrm rot="16200000" flipH="1">
+              <a:off x="7617951" y="1927110"/>
+              <a:ext cx="513893" cy="3887003"/>
+            </a:xfrm>
+            <a:prstGeom prst="bentConnector3">
+              <a:avLst>
+                <a:gd name="adj1" fmla="val 50000"/>
+              </a:avLst>
+            </a:prstGeom>
+            <a:ln w="12700">
+              <a:solidFill>
+                <a:schemeClr val="tx1"/>
+              </a:solidFill>
+              <a:headEnd type="triangle" w="med" len="med"/>
+              <a:tailEnd type="none" w="med" len="med"/>
+            </a:ln>
+          </p:spPr>
+          <p:style>
+            <a:lnRef idx="1">
+              <a:schemeClr val="accent1"/>
+            </a:lnRef>
+            <a:fillRef idx="0">
+              <a:schemeClr val="accent1"/>
+            </a:fillRef>
+            <a:effectRef idx="0">
+              <a:schemeClr val="accent1"/>
+            </a:effectRef>
+            <a:fontRef idx="minor">
+              <a:schemeClr val="tx1"/>
+            </a:fontRef>
+          </p:style>
+        </p:cxnSp>
+        <p:sp>
+          <p:nvSpPr>
+            <p:cNvPr id="22" name="TextBox 21">
+              <a:extLst>
+                <a:ext uri="{FF2B5EF4-FFF2-40B4-BE49-F238E27FC236}">
+                  <a16:creationId xmlns:a16="http://schemas.microsoft.com/office/drawing/2014/main" id="{84060A6D-A7F8-40D1-A91F-2AEF7A638957}"/>
+                </a:ext>
+              </a:extLst>
+            </p:cNvPr>
+            <p:cNvSpPr txBox="1"/>
+            <p:nvPr/>
+          </p:nvSpPr>
+          <p:spPr>
+            <a:xfrm>
+              <a:off x="5883608" y="3634305"/>
+              <a:ext cx="688504" cy="276999"/>
+            </a:xfrm>
+            <a:prstGeom prst="rect">
+              <a:avLst/>
+            </a:prstGeom>
+            <a:noFill/>
+          </p:spPr>
+          <p:txBody>
+            <a:bodyPr wrap="square" rtlCol="0">
+              <a:spAutoFit/>
+            </a:bodyPr>
+            <a:lstStyle/>
+            <a:p>
+              <a:pPr algn="ctr"/>
+              <a:r>
+                <a:rPr lang="en-US" sz="1200" dirty="0"/>
+                <a:t>“is a”</a:t>
+              </a:r>
+            </a:p>
+          </p:txBody>
+        </p:sp>
+        <p:sp>
+          <p:nvSpPr>
+            <p:cNvPr id="23" name="TextBox 22">
+              <a:extLst>
+                <a:ext uri="{FF2B5EF4-FFF2-40B4-BE49-F238E27FC236}">
+                  <a16:creationId xmlns:a16="http://schemas.microsoft.com/office/drawing/2014/main" id="{DB1F8305-0822-4BE5-9B61-AE1397EB5D1D}"/>
+                </a:ext>
+              </a:extLst>
+            </p:cNvPr>
+            <p:cNvSpPr txBox="1"/>
+            <p:nvPr/>
+          </p:nvSpPr>
+          <p:spPr>
+            <a:xfrm>
+              <a:off x="5871823" y="3897788"/>
+              <a:ext cx="470041" cy="276999"/>
+            </a:xfrm>
+            <a:prstGeom prst="rect">
+              <a:avLst/>
+            </a:prstGeom>
+            <a:noFill/>
+          </p:spPr>
+          <p:txBody>
+            <a:bodyPr wrap="square" rtlCol="0">
+              <a:spAutoFit/>
+            </a:bodyPr>
+            <a:lstStyle/>
+            <a:p>
+              <a:pPr algn="ctr"/>
+              <a:r>
+                <a:rPr lang="en-US" sz="1200" dirty="0"/>
+                <a:t>0..1</a:t>
+              </a:r>
+            </a:p>
+          </p:txBody>
+        </p:sp>
+        <p:sp>
+          <p:nvSpPr>
+            <p:cNvPr id="24" name="TextBox 23">
+              <a:extLst>
+                <a:ext uri="{FF2B5EF4-FFF2-40B4-BE49-F238E27FC236}">
+                  <a16:creationId xmlns:a16="http://schemas.microsoft.com/office/drawing/2014/main" id="{211159A5-A3ED-4C12-9F2C-87D773F19BF9}"/>
+                </a:ext>
+              </a:extLst>
+            </p:cNvPr>
+            <p:cNvSpPr txBox="1"/>
+            <p:nvPr/>
+          </p:nvSpPr>
+          <p:spPr>
+            <a:xfrm>
+              <a:off x="7814365" y="3897039"/>
+              <a:ext cx="470041" cy="276999"/>
+            </a:xfrm>
+            <a:prstGeom prst="rect">
+              <a:avLst/>
+            </a:prstGeom>
+            <a:noFill/>
+          </p:spPr>
+          <p:txBody>
+            <a:bodyPr wrap="square" rtlCol="0">
+              <a:spAutoFit/>
+            </a:bodyPr>
+            <a:lstStyle/>
+            <a:p>
+              <a:pPr algn="ctr"/>
+              <a:r>
+                <a:rPr lang="en-US" sz="1200" dirty="0"/>
+                <a:t>0..1</a:t>
+              </a:r>
+            </a:p>
+          </p:txBody>
+        </p:sp>
+        <p:sp>
+          <p:nvSpPr>
+            <p:cNvPr id="25" name="TextBox 24">
+              <a:extLst>
+                <a:ext uri="{FF2B5EF4-FFF2-40B4-BE49-F238E27FC236}">
+                  <a16:creationId xmlns:a16="http://schemas.microsoft.com/office/drawing/2014/main" id="{C4A7D693-FA75-4F15-9181-D1C0D7863637}"/>
+                </a:ext>
+              </a:extLst>
+            </p:cNvPr>
+            <p:cNvSpPr txBox="1"/>
+            <p:nvPr/>
+          </p:nvSpPr>
+          <p:spPr>
+            <a:xfrm>
+              <a:off x="9780852" y="3896578"/>
+              <a:ext cx="470041" cy="276999"/>
+            </a:xfrm>
+            <a:prstGeom prst="rect">
+              <a:avLst/>
+            </a:prstGeom>
+            <a:noFill/>
+          </p:spPr>
+          <p:txBody>
+            <a:bodyPr wrap="square" rtlCol="0">
+              <a:spAutoFit/>
+            </a:bodyPr>
+            <a:lstStyle/>
+            <a:p>
+              <a:pPr algn="ctr"/>
+              <a:r>
+                <a:rPr lang="en-US" sz="1200" dirty="0"/>
+                <a:t>0..1</a:t>
+              </a:r>
+            </a:p>
+          </p:txBody>
+        </p:sp>
+        <p:sp>
+          <p:nvSpPr>
+            <p:cNvPr id="3" name="TextBox 2">
+              <a:extLst>
+                <a:ext uri="{FF2B5EF4-FFF2-40B4-BE49-F238E27FC236}">
+                  <a16:creationId xmlns:a16="http://schemas.microsoft.com/office/drawing/2014/main" id="{F2139848-04E3-1785-23E3-5FF076EC0766}"/>
+                </a:ext>
+              </a:extLst>
+            </p:cNvPr>
+            <p:cNvSpPr txBox="1"/>
+            <p:nvPr/>
+          </p:nvSpPr>
+          <p:spPr>
+            <a:xfrm>
+              <a:off x="1133648" y="4127558"/>
+              <a:ext cx="1814246" cy="369332"/>
+            </a:xfrm>
+            <a:prstGeom prst="rect">
+              <a:avLst/>
+            </a:prstGeom>
+            <a:noFill/>
+            <a:ln w="19050">
+              <a:solidFill>
+                <a:srgbClr val="0070C0"/>
+              </a:solidFill>
+            </a:ln>
+          </p:spPr>
+          <p:txBody>
+            <a:bodyPr wrap="square" rtlCol="0">
+              <a:spAutoFit/>
+            </a:bodyPr>
+            <a:lstStyle/>
+            <a:p>
+              <a:pPr algn="ctr"/>
+              <a:r>
+                <a:rPr lang="en-US" dirty="0"/>
+                <a:t>IHE Profile</a:t>
+              </a:r>
+            </a:p>
+          </p:txBody>
+        </p:sp>
+        <p:cxnSp>
+          <p:nvCxnSpPr>
+            <p:cNvPr id="7" name="Connector: Elbow 6">
+              <a:extLst>
+                <a:ext uri="{FF2B5EF4-FFF2-40B4-BE49-F238E27FC236}">
+                  <a16:creationId xmlns:a16="http://schemas.microsoft.com/office/drawing/2014/main" id="{001C474E-C65C-0892-05F6-5803BDAF36FC}"/>
+                </a:ext>
+              </a:extLst>
+            </p:cNvPr>
+            <p:cNvCxnSpPr>
+              <a:cxnSpLocks/>
+              <a:endCxn id="3" idx="0"/>
+            </p:cNvCxnSpPr>
+            <p:nvPr/>
+          </p:nvCxnSpPr>
+          <p:spPr>
+            <a:xfrm rot="5400000">
+              <a:off x="3729138" y="1925300"/>
+              <a:ext cx="513892" cy="3890625"/>
+            </a:xfrm>
+            <a:prstGeom prst="bentConnector3">
+              <a:avLst>
+                <a:gd name="adj1" fmla="val 50000"/>
+              </a:avLst>
+            </a:prstGeom>
+            <a:ln w="12700">
+              <a:solidFill>
+                <a:schemeClr val="tx1"/>
+              </a:solidFill>
+              <a:headEnd type="triangle" w="med" len="med"/>
+              <a:tailEnd type="none" w="med" len="med"/>
+            </a:ln>
+          </p:spPr>
+          <p:style>
+            <a:lnRef idx="1">
+              <a:schemeClr val="accent1"/>
+            </a:lnRef>
+            <a:fillRef idx="0">
+              <a:schemeClr val="accent1"/>
+            </a:fillRef>
+            <a:effectRef idx="0">
+              <a:schemeClr val="accent1"/>
+            </a:effectRef>
+            <a:fontRef idx="minor">
+              <a:schemeClr val="tx1"/>
+            </a:fontRef>
+          </p:style>
+        </p:cxnSp>
+        <p:sp>
+          <p:nvSpPr>
+            <p:cNvPr id="27" name="TextBox 26">
+              <a:extLst>
+                <a:ext uri="{FF2B5EF4-FFF2-40B4-BE49-F238E27FC236}">
+                  <a16:creationId xmlns:a16="http://schemas.microsoft.com/office/drawing/2014/main" id="{5C8795A8-1CC8-983B-3668-798E196131C1}"/>
+                </a:ext>
+              </a:extLst>
+            </p:cNvPr>
+            <p:cNvSpPr txBox="1"/>
+            <p:nvPr/>
+          </p:nvSpPr>
+          <p:spPr>
+            <a:xfrm>
+              <a:off x="1971374" y="3889134"/>
+              <a:ext cx="470041" cy="276999"/>
+            </a:xfrm>
+            <a:prstGeom prst="rect">
+              <a:avLst/>
+            </a:prstGeom>
+            <a:noFill/>
+          </p:spPr>
+          <p:txBody>
+            <a:bodyPr wrap="square" rtlCol="0">
+              <a:spAutoFit/>
+            </a:bodyPr>
+            <a:lstStyle/>
+            <a:p>
+              <a:pPr algn="ctr"/>
+              <a:r>
+                <a:rPr lang="en-US" sz="1200" dirty="0"/>
+                <a:t>0..1</a:t>
+              </a:r>
+            </a:p>
+          </p:txBody>
+        </p:sp>
+      </p:grpSp>
+      <p:sp>
+        <p:nvSpPr>
+          <p:cNvPr id="6" name="TextBox 5">
+            <a:extLst>
+              <a:ext uri="{FF2B5EF4-FFF2-40B4-BE49-F238E27FC236}">
+                <a16:creationId xmlns:a16="http://schemas.microsoft.com/office/drawing/2014/main" id="{F2FC6676-BBAD-F731-F305-98D6D0A56060}"/>
               </a:ext>
             </a:extLst>
           </p:cNvPr>
@@ -3430,7 +3965,7 @@
         </p:nvSpPr>
         <p:spPr>
           <a:xfrm>
-            <a:off x="7814365" y="3454912"/>
+            <a:off x="4597721" y="2824846"/>
             <a:ext cx="470041" cy="276999"/>
           </a:xfrm>
           <a:prstGeom prst="rect">
@@ -3454,10 +3989,10 @@
       </p:sp>
       <p:sp>
         <p:nvSpPr>
-          <p:cNvPr id="25" name="TextBox 24">
-            <a:extLst>
-              <a:ext uri="{FF2B5EF4-FFF2-40B4-BE49-F238E27FC236}">
-                <a16:creationId xmlns:a16="http://schemas.microsoft.com/office/drawing/2014/main" id="{C4A7D693-FA75-4F15-9181-D1C0D7863637}"/>
+          <p:cNvPr id="9" name="TextBox 8">
+            <a:extLst>
+              <a:ext uri="{FF2B5EF4-FFF2-40B4-BE49-F238E27FC236}">
+                <a16:creationId xmlns:a16="http://schemas.microsoft.com/office/drawing/2014/main" id="{78585996-3A36-8E06-C968-D99DD1B5FFD9}"/>
               </a:ext>
             </a:extLst>
           </p:cNvPr>
@@ -3466,8 +4001,8 @@
         </p:nvSpPr>
         <p:spPr>
           <a:xfrm>
-            <a:off x="9780852" y="3454451"/>
-            <a:ext cx="470041" cy="276999"/>
+            <a:off x="5539802" y="1980537"/>
+            <a:ext cx="1112395" cy="307777"/>
           </a:xfrm>
           <a:prstGeom prst="rect">
             <a:avLst/>
@@ -3480,449 +4015,9 @@
           </a:bodyPr>
           <a:lstStyle/>
           <a:p>
-            <a:pPr algn="ctr"/>
-            <a:r>
-              <a:rPr lang="en-US" sz="1200" dirty="0"/>
-              <a:t>0..1</a:t>
-            </a:r>
-          </a:p>
-        </p:txBody>
-      </p:sp>
-      <p:sp>
-        <p:nvSpPr>
-          <p:cNvPr id="38" name="TextBox 37">
-            <a:extLst>
-              <a:ext uri="{FF2B5EF4-FFF2-40B4-BE49-F238E27FC236}">
-                <a16:creationId xmlns:a16="http://schemas.microsoft.com/office/drawing/2014/main" id="{600CF396-FC40-4DBF-9CFD-C3BB3ACA457D}"/>
-              </a:ext>
-            </a:extLst>
-          </p:cNvPr>
-          <p:cNvSpPr txBox="1"/>
-          <p:nvPr/>
-        </p:nvSpPr>
-        <p:spPr>
-          <a:xfrm>
-            <a:off x="8226823" y="2514718"/>
-            <a:ext cx="1935386" cy="646331"/>
-          </a:xfrm>
-          <a:prstGeom prst="rect">
-            <a:avLst/>
-          </a:prstGeom>
-          <a:noFill/>
-          <a:ln w="19050">
-            <a:solidFill>
-              <a:srgbClr val="0070C0"/>
-            </a:solidFill>
-          </a:ln>
-        </p:spPr>
-        <p:txBody>
-          <a:bodyPr wrap="square" rtlCol="0">
-            <a:spAutoFit/>
-          </a:bodyPr>
-          <a:lstStyle/>
-          <a:p>
-            <a:pPr algn="ctr"/>
-            <a:r>
-              <a:rPr lang="en-US" dirty="0"/>
-              <a:t>Requirement Usage</a:t>
-            </a:r>
-          </a:p>
-        </p:txBody>
-      </p:sp>
-      <p:cxnSp>
-        <p:nvCxnSpPr>
-          <p:cNvPr id="39" name="Straight Arrow Connector 38">
-            <a:extLst>
-              <a:ext uri="{FF2B5EF4-FFF2-40B4-BE49-F238E27FC236}">
-                <a16:creationId xmlns:a16="http://schemas.microsoft.com/office/drawing/2014/main" id="{9C76BD85-A956-4309-AA31-D5E1DBDC9785}"/>
-              </a:ext>
-            </a:extLst>
-          </p:cNvPr>
-          <p:cNvCxnSpPr>
-            <a:cxnSpLocks/>
-            <a:stCxn id="38" idx="1"/>
-            <a:endCxn id="11" idx="3"/>
-          </p:cNvCxnSpPr>
-          <p:nvPr/>
-        </p:nvCxnSpPr>
-        <p:spPr>
-          <a:xfrm flipH="1">
-            <a:off x="6899089" y="2837884"/>
-            <a:ext cx="1327734" cy="10490"/>
-          </a:xfrm>
-          <a:prstGeom prst="straightConnector1">
-            <a:avLst/>
-          </a:prstGeom>
-          <a:ln w="12700">
-            <a:solidFill>
-              <a:schemeClr val="tx1"/>
-            </a:solidFill>
-            <a:headEnd type="arrow" w="med" len="med"/>
-            <a:tailEnd type="arrow" w="med" len="med"/>
-          </a:ln>
-        </p:spPr>
-        <p:style>
-          <a:lnRef idx="1">
-            <a:schemeClr val="accent1"/>
-          </a:lnRef>
-          <a:fillRef idx="0">
-            <a:schemeClr val="accent1"/>
-          </a:fillRef>
-          <a:effectRef idx="0">
-            <a:schemeClr val="accent1"/>
-          </a:effectRef>
-          <a:fontRef idx="minor">
-            <a:schemeClr val="tx1"/>
-          </a:fontRef>
-        </p:style>
-      </p:cxnSp>
-      <p:sp>
-        <p:nvSpPr>
-          <p:cNvPr id="43" name="TextBox 42">
-            <a:extLst>
-              <a:ext uri="{FF2B5EF4-FFF2-40B4-BE49-F238E27FC236}">
-                <a16:creationId xmlns:a16="http://schemas.microsoft.com/office/drawing/2014/main" id="{A83C4106-1FE4-4B73-AFC6-3F8BB6D9A006}"/>
-              </a:ext>
-            </a:extLst>
-          </p:cNvPr>
-          <p:cNvSpPr txBox="1"/>
-          <p:nvPr/>
-        </p:nvSpPr>
-        <p:spPr>
-          <a:xfrm>
-            <a:off x="6827727" y="2577213"/>
-            <a:ext cx="470041" cy="276999"/>
-          </a:xfrm>
-          <a:prstGeom prst="rect">
-            <a:avLst/>
-          </a:prstGeom>
-          <a:noFill/>
-        </p:spPr>
-        <p:txBody>
-          <a:bodyPr wrap="square" rtlCol="0">
-            <a:spAutoFit/>
-          </a:bodyPr>
-          <a:lstStyle/>
-          <a:p>
-            <a:pPr algn="ctr"/>
-            <a:r>
-              <a:rPr lang="en-US" sz="1200" dirty="0"/>
-              <a:t>1..*</a:t>
-            </a:r>
-          </a:p>
-        </p:txBody>
-      </p:sp>
-      <p:sp>
-        <p:nvSpPr>
-          <p:cNvPr id="44" name="TextBox 43">
-            <a:extLst>
-              <a:ext uri="{FF2B5EF4-FFF2-40B4-BE49-F238E27FC236}">
-                <a16:creationId xmlns:a16="http://schemas.microsoft.com/office/drawing/2014/main" id="{A4B9659B-20CA-43A7-8D92-DED1981EED4C}"/>
-              </a:ext>
-            </a:extLst>
-          </p:cNvPr>
-          <p:cNvSpPr txBox="1"/>
-          <p:nvPr/>
-        </p:nvSpPr>
-        <p:spPr>
-          <a:xfrm>
-            <a:off x="7845687" y="2852784"/>
-            <a:ext cx="470041" cy="276999"/>
-          </a:xfrm>
-          <a:prstGeom prst="rect">
-            <a:avLst/>
-          </a:prstGeom>
-          <a:noFill/>
-        </p:spPr>
-        <p:txBody>
-          <a:bodyPr wrap="square" rtlCol="0">
-            <a:spAutoFit/>
-          </a:bodyPr>
-          <a:lstStyle/>
-          <a:p>
-            <a:pPr algn="ctr"/>
-            <a:r>
-              <a:rPr lang="en-US" sz="1200" dirty="0"/>
-              <a:t>1..*</a:t>
-            </a:r>
-          </a:p>
-        </p:txBody>
-      </p:sp>
-      <p:sp>
-        <p:nvSpPr>
-          <p:cNvPr id="2" name="TextBox 1">
-            <a:extLst>
-              <a:ext uri="{FF2B5EF4-FFF2-40B4-BE49-F238E27FC236}">
-                <a16:creationId xmlns:a16="http://schemas.microsoft.com/office/drawing/2014/main" id="{8D3D3018-D266-5AC4-50BB-C4F80D42E7CF}"/>
-              </a:ext>
-            </a:extLst>
-          </p:cNvPr>
-          <p:cNvSpPr txBox="1"/>
-          <p:nvPr/>
-        </p:nvSpPr>
-        <p:spPr>
-          <a:xfrm>
-            <a:off x="6463705" y="2196792"/>
-            <a:ext cx="870767" cy="307777"/>
-          </a:xfrm>
-          <a:prstGeom prst="rect">
-            <a:avLst/>
-          </a:prstGeom>
-          <a:noFill/>
-        </p:spPr>
-        <p:txBody>
-          <a:bodyPr wrap="square" rtlCol="0">
-            <a:spAutoFit/>
-          </a:bodyPr>
-          <a:lstStyle/>
-          <a:p>
-            <a:pPr algn="ctr"/>
             <a:r>
               <a:rPr lang="en-US" sz="1400" dirty="0"/>
-              <a:t>satisfies</a:t>
-            </a:r>
-          </a:p>
-        </p:txBody>
-      </p:sp>
-      <p:cxnSp>
-        <p:nvCxnSpPr>
-          <p:cNvPr id="4" name="Connector: Elbow 3">
-            <a:extLst>
-              <a:ext uri="{FF2B5EF4-FFF2-40B4-BE49-F238E27FC236}">
-                <a16:creationId xmlns:a16="http://schemas.microsoft.com/office/drawing/2014/main" id="{3A280D7C-07F9-945E-1A22-A2319C7CD28A}"/>
-              </a:ext>
-            </a:extLst>
-          </p:cNvPr>
-          <p:cNvCxnSpPr>
-            <a:cxnSpLocks/>
-            <a:stCxn id="11" idx="1"/>
-            <a:endCxn id="11" idx="0"/>
-          </p:cNvCxnSpPr>
-          <p:nvPr/>
-        </p:nvCxnSpPr>
-        <p:spPr>
-          <a:xfrm rot="10800000" flipH="1">
-            <a:off x="4963702" y="2525208"/>
-            <a:ext cx="967693" cy="323166"/>
-          </a:xfrm>
-          <a:prstGeom prst="bentConnector4">
-            <a:avLst>
-              <a:gd name="adj1" fmla="val -23623"/>
-              <a:gd name="adj2" fmla="val 170738"/>
-            </a:avLst>
-          </a:prstGeom>
-          <a:ln w="15875">
-            <a:tailEnd type="triangle"/>
-          </a:ln>
-        </p:spPr>
-        <p:style>
-          <a:lnRef idx="1">
-            <a:schemeClr val="accent1"/>
-          </a:lnRef>
-          <a:fillRef idx="0">
-            <a:schemeClr val="accent1"/>
-          </a:fillRef>
-          <a:effectRef idx="0">
-            <a:schemeClr val="accent1"/>
-          </a:effectRef>
-          <a:fontRef idx="minor">
-            <a:schemeClr val="tx1"/>
-          </a:fontRef>
-        </p:style>
-      </p:cxnSp>
-      <p:sp>
-        <p:nvSpPr>
-          <p:cNvPr id="5" name="TextBox 4">
-            <a:extLst>
-              <a:ext uri="{FF2B5EF4-FFF2-40B4-BE49-F238E27FC236}">
-                <a16:creationId xmlns:a16="http://schemas.microsoft.com/office/drawing/2014/main" id="{355F2B92-AD06-F4AE-CC2B-68D96693BA4E}"/>
-              </a:ext>
-            </a:extLst>
-          </p:cNvPr>
-          <p:cNvSpPr txBox="1"/>
-          <p:nvPr/>
-        </p:nvSpPr>
-        <p:spPr>
-          <a:xfrm>
-            <a:off x="5567690" y="2271738"/>
-            <a:ext cx="470041" cy="276999"/>
-          </a:xfrm>
-          <a:prstGeom prst="rect">
-            <a:avLst/>
-          </a:prstGeom>
-          <a:noFill/>
-        </p:spPr>
-        <p:txBody>
-          <a:bodyPr wrap="square" rtlCol="0">
-            <a:spAutoFit/>
-          </a:bodyPr>
-          <a:lstStyle/>
-          <a:p>
-            <a:pPr algn="ctr"/>
-            <a:r>
-              <a:rPr lang="en-US" sz="1200" dirty="0"/>
-              <a:t>0..*</a:t>
-            </a:r>
-          </a:p>
-        </p:txBody>
-      </p:sp>
-      <p:sp>
-        <p:nvSpPr>
-          <p:cNvPr id="8" name="TextBox 7">
-            <a:extLst>
-              <a:ext uri="{FF2B5EF4-FFF2-40B4-BE49-F238E27FC236}">
-                <a16:creationId xmlns:a16="http://schemas.microsoft.com/office/drawing/2014/main" id="{78049040-9709-544F-8704-030D25765EAB}"/>
-              </a:ext>
-            </a:extLst>
-          </p:cNvPr>
-          <p:cNvSpPr txBox="1"/>
-          <p:nvPr/>
-        </p:nvSpPr>
-        <p:spPr>
-          <a:xfrm>
-            <a:off x="4177467" y="2017377"/>
-            <a:ext cx="1161275" cy="523220"/>
-          </a:xfrm>
-          <a:prstGeom prst="rect">
-            <a:avLst/>
-          </a:prstGeom>
-          <a:noFill/>
-        </p:spPr>
-        <p:txBody>
-          <a:bodyPr wrap="square" rtlCol="0">
-            <a:spAutoFit/>
-          </a:bodyPr>
-          <a:lstStyle/>
-          <a:p>
-            <a:r>
-              <a:rPr lang="en-US" sz="1400" dirty="0"/>
-              <a:t>requirement group</a:t>
-            </a:r>
-          </a:p>
-        </p:txBody>
-      </p:sp>
-      <p:sp>
-        <p:nvSpPr>
-          <p:cNvPr id="3" name="TextBox 2">
-            <a:extLst>
-              <a:ext uri="{FF2B5EF4-FFF2-40B4-BE49-F238E27FC236}">
-                <a16:creationId xmlns:a16="http://schemas.microsoft.com/office/drawing/2014/main" id="{F2139848-04E3-1785-23E3-5FF076EC0766}"/>
-              </a:ext>
-            </a:extLst>
-          </p:cNvPr>
-          <p:cNvSpPr txBox="1"/>
-          <p:nvPr/>
-        </p:nvSpPr>
-        <p:spPr>
-          <a:xfrm>
-            <a:off x="1133648" y="3685431"/>
-            <a:ext cx="1814246" cy="369332"/>
-          </a:xfrm>
-          <a:prstGeom prst="rect">
-            <a:avLst/>
-          </a:prstGeom>
-          <a:noFill/>
-          <a:ln w="19050">
-            <a:solidFill>
-              <a:srgbClr val="0070C0"/>
-            </a:solidFill>
-          </a:ln>
-        </p:spPr>
-        <p:txBody>
-          <a:bodyPr wrap="square" rtlCol="0">
-            <a:spAutoFit/>
-          </a:bodyPr>
-          <a:lstStyle/>
-          <a:p>
-            <a:pPr algn="ctr"/>
-            <a:r>
-              <a:rPr lang="en-US" dirty="0"/>
-              <a:t>IHE Profile</a:t>
-            </a:r>
-          </a:p>
-        </p:txBody>
-      </p:sp>
-      <p:cxnSp>
-        <p:nvCxnSpPr>
-          <p:cNvPr id="7" name="Connector: Elbow 6">
-            <a:extLst>
-              <a:ext uri="{FF2B5EF4-FFF2-40B4-BE49-F238E27FC236}">
-                <a16:creationId xmlns:a16="http://schemas.microsoft.com/office/drawing/2014/main" id="{001C474E-C65C-0892-05F6-5803BDAF36FC}"/>
-              </a:ext>
-            </a:extLst>
-          </p:cNvPr>
-          <p:cNvCxnSpPr>
-            <a:cxnSpLocks/>
-            <a:stCxn id="11" idx="2"/>
-            <a:endCxn id="3" idx="0"/>
-          </p:cNvCxnSpPr>
-          <p:nvPr/>
-        </p:nvCxnSpPr>
-        <p:spPr>
-          <a:xfrm rot="5400000">
-            <a:off x="3729138" y="1483173"/>
-            <a:ext cx="513892" cy="3890625"/>
-          </a:xfrm>
-          <a:prstGeom prst="bentConnector3">
-            <a:avLst>
-              <a:gd name="adj1" fmla="val 50000"/>
-            </a:avLst>
-          </a:prstGeom>
-          <a:ln w="12700">
-            <a:solidFill>
-              <a:schemeClr val="tx1"/>
-            </a:solidFill>
-            <a:headEnd type="triangle" w="med" len="med"/>
-            <a:tailEnd type="none" w="med" len="med"/>
-          </a:ln>
-        </p:spPr>
-        <p:style>
-          <a:lnRef idx="1">
-            <a:schemeClr val="accent1"/>
-          </a:lnRef>
-          <a:fillRef idx="0">
-            <a:schemeClr val="accent1"/>
-          </a:fillRef>
-          <a:effectRef idx="0">
-            <a:schemeClr val="accent1"/>
-          </a:effectRef>
-          <a:fontRef idx="minor">
-            <a:schemeClr val="tx1"/>
-          </a:fontRef>
-        </p:style>
-      </p:cxnSp>
-      <p:sp>
-        <p:nvSpPr>
-          <p:cNvPr id="27" name="TextBox 26">
-            <a:extLst>
-              <a:ext uri="{FF2B5EF4-FFF2-40B4-BE49-F238E27FC236}">
-                <a16:creationId xmlns:a16="http://schemas.microsoft.com/office/drawing/2014/main" id="{5C8795A8-1CC8-983B-3668-798E196131C1}"/>
-              </a:ext>
-            </a:extLst>
-          </p:cNvPr>
-          <p:cNvSpPr txBox="1"/>
-          <p:nvPr/>
-        </p:nvSpPr>
-        <p:spPr>
-          <a:xfrm>
-            <a:off x="1971374" y="3447007"/>
-            <a:ext cx="470041" cy="276999"/>
-          </a:xfrm>
-          <a:prstGeom prst="rect">
-            <a:avLst/>
-          </a:prstGeom>
-          <a:noFill/>
-        </p:spPr>
-        <p:txBody>
-          <a:bodyPr wrap="square" rtlCol="0">
-            <a:spAutoFit/>
-          </a:bodyPr>
-          <a:lstStyle/>
-          <a:p>
-            <a:pPr algn="ctr"/>
-            <a:r>
-              <a:rPr lang="en-US" sz="1200" dirty="0"/>
-              <a:t>0..1</a:t>
+              <a:t>sibling</a:t>
             </a:r>
           </a:p>
         </p:txBody>

</xml_diff>